<commit_message>
Updated the ui to the actual version. Still alpha of course.
</commit_message>
<xml_diff>
--- a/Prototyping Diagrams/UI Design Simulation.pptx
+++ b/Prototyping Diagrams/UI Design Simulation.pptx
@@ -7,6 +7,7 @@
   <p:sldIdLst>
     <p:sldId id="256" r:id="rId2"/>
     <p:sldId id="257" r:id="rId3"/>
+    <p:sldId id="258" r:id="rId4"/>
   </p:sldIdLst>
   <p:sldSz cx="12192000" cy="6858000"/>
   <p:notesSz cx="6858000" cy="9144000"/>
@@ -105,6 +106,11 @@
       </a:defRPr>
     </a:lvl9pPr>
   </p:defaultTextStyle>
+  <p:extLst>
+    <p:ext uri="{EFAFB233-063F-42B5-8137-9DF3F51BA10A}">
+      <p15:sldGuideLst xmlns:p15="http://schemas.microsoft.com/office/powerpoint/2012/main"/>
+    </p:ext>
+  </p:extLst>
 </p:presentation>
 </file>
 
@@ -255,7 +261,7 @@
           <a:p>
             <a:fld id="{0FFA42CB-F213-434B-B42A-8D961705B491}" type="datetimeFigureOut">
               <a:rPr lang="en-US" smtClean="0"/>
-              <a:t>3/20/2025</a:t>
+              <a:t>3/25/2025</a:t>
             </a:fld>
             <a:endParaRPr lang="en-US"/>
           </a:p>
@@ -453,7 +459,7 @@
           <a:p>
             <a:fld id="{0FFA42CB-F213-434B-B42A-8D961705B491}" type="datetimeFigureOut">
               <a:rPr lang="en-US" smtClean="0"/>
-              <a:t>3/20/2025</a:t>
+              <a:t>3/25/2025</a:t>
             </a:fld>
             <a:endParaRPr lang="en-US"/>
           </a:p>
@@ -661,7 +667,7 @@
           <a:p>
             <a:fld id="{0FFA42CB-F213-434B-B42A-8D961705B491}" type="datetimeFigureOut">
               <a:rPr lang="en-US" smtClean="0"/>
-              <a:t>3/20/2025</a:t>
+              <a:t>3/25/2025</a:t>
             </a:fld>
             <a:endParaRPr lang="en-US"/>
           </a:p>
@@ -859,7 +865,7 @@
           <a:p>
             <a:fld id="{0FFA42CB-F213-434B-B42A-8D961705B491}" type="datetimeFigureOut">
               <a:rPr lang="en-US" smtClean="0"/>
-              <a:t>3/20/2025</a:t>
+              <a:t>3/25/2025</a:t>
             </a:fld>
             <a:endParaRPr lang="en-US"/>
           </a:p>
@@ -1134,7 +1140,7 @@
           <a:p>
             <a:fld id="{0FFA42CB-F213-434B-B42A-8D961705B491}" type="datetimeFigureOut">
               <a:rPr lang="en-US" smtClean="0"/>
-              <a:t>3/20/2025</a:t>
+              <a:t>3/25/2025</a:t>
             </a:fld>
             <a:endParaRPr lang="en-US"/>
           </a:p>
@@ -1399,7 +1405,7 @@
           <a:p>
             <a:fld id="{0FFA42CB-F213-434B-B42A-8D961705B491}" type="datetimeFigureOut">
               <a:rPr lang="en-US" smtClean="0"/>
-              <a:t>3/20/2025</a:t>
+              <a:t>3/25/2025</a:t>
             </a:fld>
             <a:endParaRPr lang="en-US"/>
           </a:p>
@@ -1811,7 +1817,7 @@
           <a:p>
             <a:fld id="{0FFA42CB-F213-434B-B42A-8D961705B491}" type="datetimeFigureOut">
               <a:rPr lang="en-US" smtClean="0"/>
-              <a:t>3/20/2025</a:t>
+              <a:t>3/25/2025</a:t>
             </a:fld>
             <a:endParaRPr lang="en-US"/>
           </a:p>
@@ -1952,7 +1958,7 @@
           <a:p>
             <a:fld id="{0FFA42CB-F213-434B-B42A-8D961705B491}" type="datetimeFigureOut">
               <a:rPr lang="en-US" smtClean="0"/>
-              <a:t>3/20/2025</a:t>
+              <a:t>3/25/2025</a:t>
             </a:fld>
             <a:endParaRPr lang="en-US"/>
           </a:p>
@@ -2065,7 +2071,7 @@
           <a:p>
             <a:fld id="{0FFA42CB-F213-434B-B42A-8D961705B491}" type="datetimeFigureOut">
               <a:rPr lang="en-US" smtClean="0"/>
-              <a:t>3/20/2025</a:t>
+              <a:t>3/25/2025</a:t>
             </a:fld>
             <a:endParaRPr lang="en-US"/>
           </a:p>
@@ -2376,7 +2382,7 @@
           <a:p>
             <a:fld id="{0FFA42CB-F213-434B-B42A-8D961705B491}" type="datetimeFigureOut">
               <a:rPr lang="en-US" smtClean="0"/>
-              <a:t>3/20/2025</a:t>
+              <a:t>3/25/2025</a:t>
             </a:fld>
             <a:endParaRPr lang="en-US"/>
           </a:p>
@@ -2664,7 +2670,7 @@
           <a:p>
             <a:fld id="{0FFA42CB-F213-434B-B42A-8D961705B491}" type="datetimeFigureOut">
               <a:rPr lang="en-US" smtClean="0"/>
-              <a:t>3/20/2025</a:t>
+              <a:t>3/25/2025</a:t>
             </a:fld>
             <a:endParaRPr lang="en-US"/>
           </a:p>
@@ -2905,7 +2911,7 @@
           <a:p>
             <a:fld id="{0FFA42CB-F213-434B-B42A-8D961705B491}" type="datetimeFigureOut">
               <a:rPr lang="en-US" smtClean="0"/>
-              <a:t>3/20/2025</a:t>
+              <a:t>3/25/2025</a:t>
             </a:fld>
             <a:endParaRPr lang="en-US"/>
           </a:p>
@@ -3410,51 +3416,1415 @@
       </p:grpSpPr>
       <p:sp>
         <p:nvSpPr>
-          <p:cNvPr id="2" name="Title 1">
-            <a:extLst>
-              <a:ext uri="{FF2B5EF4-FFF2-40B4-BE49-F238E27FC236}">
-                <a16:creationId xmlns:a16="http://schemas.microsoft.com/office/drawing/2014/main" id="{C9134D98-DEEA-8B35-5F30-775899C80902}"/>
-              </a:ext>
-            </a:extLst>
-          </p:cNvPr>
-          <p:cNvSpPr>
-            <a:spLocks noGrp="1"/>
-          </p:cNvSpPr>
-          <p:nvPr>
-            <p:ph type="title"/>
-          </p:nvPr>
-        </p:nvSpPr>
-        <p:spPr/>
-        <p:txBody>
-          <a:bodyPr/>
-          <a:lstStyle/>
-          <a:p>
+          <p:cNvPr id="4" name="Rectangle 3">
+            <a:extLst>
+              <a:ext uri="{FF2B5EF4-FFF2-40B4-BE49-F238E27FC236}">
+                <a16:creationId xmlns:a16="http://schemas.microsoft.com/office/drawing/2014/main" id="{CCDF36F3-F779-0E6F-177F-7F2938AE7DB8}"/>
+              </a:ext>
+            </a:extLst>
+          </p:cNvPr>
+          <p:cNvSpPr/>
+          <p:nvPr/>
+        </p:nvSpPr>
+        <p:spPr>
+          <a:xfrm>
+            <a:off x="357352" y="478221"/>
+            <a:ext cx="11535103" cy="6074979"/>
+          </a:xfrm>
+          <a:prstGeom prst="rect">
+            <a:avLst/>
+          </a:prstGeom>
+          <a:solidFill>
+            <a:schemeClr val="bg1">
+              <a:lumMod val="95000"/>
+            </a:schemeClr>
+          </a:solidFill>
+        </p:spPr>
+        <p:style>
+          <a:lnRef idx="2">
+            <a:schemeClr val="accent4">
+              <a:shade val="15000"/>
+            </a:schemeClr>
+          </a:lnRef>
+          <a:fillRef idx="1">
+            <a:schemeClr val="accent4"/>
+          </a:fillRef>
+          <a:effectRef idx="0">
+            <a:schemeClr val="accent4"/>
+          </a:effectRef>
+          <a:fontRef idx="minor">
+            <a:schemeClr val="lt1"/>
+          </a:fontRef>
+        </p:style>
+        <p:txBody>
+          <a:bodyPr rtlCol="0" anchor="ctr"/>
+          <a:lstStyle/>
+          <a:p>
+            <a:pPr algn="ctr"/>
             <a:endParaRPr lang="en-US"/>
           </a:p>
         </p:txBody>
       </p:sp>
       <p:sp>
         <p:nvSpPr>
-          <p:cNvPr id="3" name="Content Placeholder 2">
-            <a:extLst>
-              <a:ext uri="{FF2B5EF4-FFF2-40B4-BE49-F238E27FC236}">
-                <a16:creationId xmlns:a16="http://schemas.microsoft.com/office/drawing/2014/main" id="{FE398B93-C258-347F-70C8-A7A3044DADC9}"/>
-              </a:ext>
-            </a:extLst>
-          </p:cNvPr>
-          <p:cNvSpPr>
-            <a:spLocks noGrp="1"/>
-          </p:cNvSpPr>
-          <p:nvPr>
-            <p:ph idx="1"/>
-          </p:nvPr>
-        </p:nvSpPr>
-        <p:spPr/>
-        <p:txBody>
-          <a:bodyPr/>
-          <a:lstStyle/>
-          <a:p>
+          <p:cNvPr id="5" name="Rectangle 4">
+            <a:extLst>
+              <a:ext uri="{FF2B5EF4-FFF2-40B4-BE49-F238E27FC236}">
+                <a16:creationId xmlns:a16="http://schemas.microsoft.com/office/drawing/2014/main" id="{1D40F83C-E1E2-9CB4-A3A5-B4737B7250F3}"/>
+              </a:ext>
+            </a:extLst>
+          </p:cNvPr>
+          <p:cNvSpPr/>
+          <p:nvPr/>
+        </p:nvSpPr>
+        <p:spPr>
+          <a:xfrm>
+            <a:off x="357352" y="304800"/>
+            <a:ext cx="11535103" cy="173421"/>
+          </a:xfrm>
+          <a:prstGeom prst="rect">
+            <a:avLst/>
+          </a:prstGeom>
+          <a:solidFill>
+            <a:schemeClr val="accent1"/>
+          </a:solidFill>
+        </p:spPr>
+        <p:style>
+          <a:lnRef idx="2">
+            <a:schemeClr val="dk1"/>
+          </a:lnRef>
+          <a:fillRef idx="1">
+            <a:schemeClr val="lt1"/>
+          </a:fillRef>
+          <a:effectRef idx="0">
+            <a:schemeClr val="dk1"/>
+          </a:effectRef>
+          <a:fontRef idx="minor">
+            <a:schemeClr val="dk1"/>
+          </a:fontRef>
+        </p:style>
+        <p:txBody>
+          <a:bodyPr rtlCol="0" anchor="ctr"/>
+          <a:lstStyle/>
+          <a:p>
+            <a:pPr algn="ctr"/>
             <a:endParaRPr lang="en-US"/>
+          </a:p>
+        </p:txBody>
+      </p:sp>
+      <p:sp>
+        <p:nvSpPr>
+          <p:cNvPr id="6" name="Rectangle 5">
+            <a:extLst>
+              <a:ext uri="{FF2B5EF4-FFF2-40B4-BE49-F238E27FC236}">
+                <a16:creationId xmlns:a16="http://schemas.microsoft.com/office/drawing/2014/main" id="{BADC3338-5022-BEB8-9B57-3EA3CF6CD9C7}"/>
+              </a:ext>
+            </a:extLst>
+          </p:cNvPr>
+          <p:cNvSpPr/>
+          <p:nvPr/>
+        </p:nvSpPr>
+        <p:spPr>
+          <a:xfrm>
+            <a:off x="11719034" y="304800"/>
+            <a:ext cx="173421" cy="173421"/>
+          </a:xfrm>
+          <a:prstGeom prst="rect">
+            <a:avLst/>
+          </a:prstGeom>
+          <a:solidFill>
+            <a:schemeClr val="bg1"/>
+          </a:solidFill>
+        </p:spPr>
+        <p:style>
+          <a:lnRef idx="2">
+            <a:schemeClr val="accent1">
+              <a:shade val="15000"/>
+            </a:schemeClr>
+          </a:lnRef>
+          <a:fillRef idx="1">
+            <a:schemeClr val="accent1"/>
+          </a:fillRef>
+          <a:effectRef idx="0">
+            <a:schemeClr val="accent1"/>
+          </a:effectRef>
+          <a:fontRef idx="minor">
+            <a:schemeClr val="lt1"/>
+          </a:fontRef>
+        </p:style>
+        <p:txBody>
+          <a:bodyPr rtlCol="0" anchor="ctr"/>
+          <a:lstStyle/>
+          <a:p>
+            <a:pPr algn="ctr"/>
+            <a:r>
+              <a:rPr lang="en-US" sz="1200" dirty="0">
+                <a:solidFill>
+                  <a:schemeClr val="tx1"/>
+                </a:solidFill>
+              </a:rPr>
+              <a:t>X</a:t>
+            </a:r>
+          </a:p>
+        </p:txBody>
+      </p:sp>
+      <p:sp>
+        <p:nvSpPr>
+          <p:cNvPr id="7" name="Rectangle 6">
+            <a:extLst>
+              <a:ext uri="{FF2B5EF4-FFF2-40B4-BE49-F238E27FC236}">
+                <a16:creationId xmlns:a16="http://schemas.microsoft.com/office/drawing/2014/main" id="{1B9046A0-09E7-D32E-DB17-01AB45FFFF63}"/>
+              </a:ext>
+            </a:extLst>
+          </p:cNvPr>
+          <p:cNvSpPr/>
+          <p:nvPr/>
+        </p:nvSpPr>
+        <p:spPr>
+          <a:xfrm>
+            <a:off x="11545613" y="304800"/>
+            <a:ext cx="173421" cy="173421"/>
+          </a:xfrm>
+          <a:prstGeom prst="rect">
+            <a:avLst/>
+          </a:prstGeom>
+          <a:solidFill>
+            <a:schemeClr val="bg1"/>
+          </a:solidFill>
+        </p:spPr>
+        <p:style>
+          <a:lnRef idx="2">
+            <a:schemeClr val="accent1">
+              <a:shade val="15000"/>
+            </a:schemeClr>
+          </a:lnRef>
+          <a:fillRef idx="1">
+            <a:schemeClr val="accent1"/>
+          </a:fillRef>
+          <a:effectRef idx="0">
+            <a:schemeClr val="accent1"/>
+          </a:effectRef>
+          <a:fontRef idx="minor">
+            <a:schemeClr val="lt1"/>
+          </a:fontRef>
+        </p:style>
+        <p:txBody>
+          <a:bodyPr rtlCol="0" anchor="ctr"/>
+          <a:lstStyle/>
+          <a:p>
+            <a:pPr algn="ctr"/>
+            <a:r>
+              <a:rPr lang="en-US" sz="1200" dirty="0">
+                <a:solidFill>
+                  <a:schemeClr val="tx1"/>
+                </a:solidFill>
+              </a:rPr>
+              <a:t>▢</a:t>
+            </a:r>
+          </a:p>
+        </p:txBody>
+      </p:sp>
+      <p:sp>
+        <p:nvSpPr>
+          <p:cNvPr id="8" name="Rectangle 7">
+            <a:extLst>
+              <a:ext uri="{FF2B5EF4-FFF2-40B4-BE49-F238E27FC236}">
+                <a16:creationId xmlns:a16="http://schemas.microsoft.com/office/drawing/2014/main" id="{D1E3E186-3A29-B170-FE4C-DA04F2A8D491}"/>
+              </a:ext>
+            </a:extLst>
+          </p:cNvPr>
+          <p:cNvSpPr/>
+          <p:nvPr/>
+        </p:nvSpPr>
+        <p:spPr>
+          <a:xfrm>
+            <a:off x="11377447" y="304800"/>
+            <a:ext cx="173421" cy="173421"/>
+          </a:xfrm>
+          <a:prstGeom prst="rect">
+            <a:avLst/>
+          </a:prstGeom>
+          <a:solidFill>
+            <a:schemeClr val="bg1"/>
+          </a:solidFill>
+        </p:spPr>
+        <p:style>
+          <a:lnRef idx="2">
+            <a:schemeClr val="accent1">
+              <a:shade val="15000"/>
+            </a:schemeClr>
+          </a:lnRef>
+          <a:fillRef idx="1">
+            <a:schemeClr val="accent1"/>
+          </a:fillRef>
+          <a:effectRef idx="0">
+            <a:schemeClr val="accent1"/>
+          </a:effectRef>
+          <a:fontRef idx="minor">
+            <a:schemeClr val="lt1"/>
+          </a:fontRef>
+        </p:style>
+        <p:txBody>
+          <a:bodyPr rtlCol="0" anchor="ctr"/>
+          <a:lstStyle/>
+          <a:p>
+            <a:pPr algn="ctr"/>
+            <a:r>
+              <a:rPr lang="en-US" sz="1200" b="0" i="0" dirty="0">
+                <a:solidFill>
+                  <a:srgbClr val="001D35"/>
+                </a:solidFill>
+                <a:effectLst/>
+                <a:latin typeface="Google Sans"/>
+              </a:rPr>
+              <a:t>–</a:t>
+            </a:r>
+            <a:endParaRPr lang="en-US" sz="1200" dirty="0">
+              <a:solidFill>
+                <a:schemeClr val="tx1"/>
+              </a:solidFill>
+            </a:endParaRPr>
+          </a:p>
+        </p:txBody>
+      </p:sp>
+      <p:sp>
+        <p:nvSpPr>
+          <p:cNvPr id="9" name="Rectangle 8">
+            <a:extLst>
+              <a:ext uri="{FF2B5EF4-FFF2-40B4-BE49-F238E27FC236}">
+                <a16:creationId xmlns:a16="http://schemas.microsoft.com/office/drawing/2014/main" id="{87C2394D-80A5-9C67-999B-56358C680C59}"/>
+              </a:ext>
+            </a:extLst>
+          </p:cNvPr>
+          <p:cNvSpPr/>
+          <p:nvPr/>
+        </p:nvSpPr>
+        <p:spPr>
+          <a:xfrm>
+            <a:off x="357352" y="478221"/>
+            <a:ext cx="677917" cy="6074979"/>
+          </a:xfrm>
+          <a:prstGeom prst="rect">
+            <a:avLst/>
+          </a:prstGeom>
+          <a:solidFill>
+            <a:schemeClr val="bg1">
+              <a:lumMod val="65000"/>
+            </a:schemeClr>
+          </a:solidFill>
+        </p:spPr>
+        <p:style>
+          <a:lnRef idx="2">
+            <a:schemeClr val="accent1">
+              <a:shade val="15000"/>
+            </a:schemeClr>
+          </a:lnRef>
+          <a:fillRef idx="1">
+            <a:schemeClr val="accent1"/>
+          </a:fillRef>
+          <a:effectRef idx="0">
+            <a:schemeClr val="accent1"/>
+          </a:effectRef>
+          <a:fontRef idx="minor">
+            <a:schemeClr val="lt1"/>
+          </a:fontRef>
+        </p:style>
+        <p:txBody>
+          <a:bodyPr rtlCol="0" anchor="ctr"/>
+          <a:lstStyle/>
+          <a:p>
+            <a:pPr algn="ctr"/>
+            <a:endParaRPr lang="en-US">
+              <a:solidFill>
+                <a:schemeClr val="tx1"/>
+              </a:solidFill>
+            </a:endParaRPr>
+          </a:p>
+        </p:txBody>
+      </p:sp>
+      <p:pic>
+        <p:nvPicPr>
+          <p:cNvPr id="11" name="Graphic 10">
+            <a:extLst>
+              <a:ext uri="{FF2B5EF4-FFF2-40B4-BE49-F238E27FC236}">
+                <a16:creationId xmlns:a16="http://schemas.microsoft.com/office/drawing/2014/main" id="{242988F7-12F6-C6A4-C1E9-7BDB3640FE49}"/>
+              </a:ext>
+            </a:extLst>
+          </p:cNvPr>
+          <p:cNvPicPr>
+            <a:picLocks noChangeAspect="1"/>
+          </p:cNvPicPr>
+          <p:nvPr/>
+        </p:nvPicPr>
+        <p:blipFill>
+          <a:blip r:embed="rId2">
+            <a:extLst>
+              <a:ext uri="{96DAC541-7B7A-43D3-8B79-37D633B846F1}">
+                <asvg:svgBlip xmlns:asvg="http://schemas.microsoft.com/office/drawing/2016/SVG/main" r:embed="rId3"/>
+              </a:ext>
+            </a:extLst>
+          </a:blip>
+          <a:stretch>
+            <a:fillRect/>
+          </a:stretch>
+        </p:blipFill>
+        <p:spPr>
+          <a:xfrm>
+            <a:off x="461141" y="517635"/>
+            <a:ext cx="470338" cy="470338"/>
+          </a:xfrm>
+          <a:prstGeom prst="rect">
+            <a:avLst/>
+          </a:prstGeom>
+        </p:spPr>
+      </p:pic>
+      <p:pic>
+        <p:nvPicPr>
+          <p:cNvPr id="15" name="Graphic 14">
+            <a:extLst>
+              <a:ext uri="{FF2B5EF4-FFF2-40B4-BE49-F238E27FC236}">
+                <a16:creationId xmlns:a16="http://schemas.microsoft.com/office/drawing/2014/main" id="{BEB3059F-778D-FE4B-4998-47C749541FC2}"/>
+              </a:ext>
+            </a:extLst>
+          </p:cNvPr>
+          <p:cNvPicPr>
+            <a:picLocks noChangeAspect="1"/>
+          </p:cNvPicPr>
+          <p:nvPr/>
+        </p:nvPicPr>
+        <p:blipFill>
+          <a:blip r:embed="rId4">
+            <a:extLst>
+              <a:ext uri="{96DAC541-7B7A-43D3-8B79-37D633B846F1}">
+                <asvg:svgBlip xmlns:asvg="http://schemas.microsoft.com/office/drawing/2016/SVG/main" r:embed="rId5"/>
+              </a:ext>
+            </a:extLst>
+          </a:blip>
+          <a:stretch>
+            <a:fillRect/>
+          </a:stretch>
+        </p:blipFill>
+        <p:spPr>
+          <a:xfrm>
+            <a:off x="461141" y="1161394"/>
+            <a:ext cx="470338" cy="470338"/>
+          </a:xfrm>
+          <a:prstGeom prst="rect">
+            <a:avLst/>
+          </a:prstGeom>
+        </p:spPr>
+      </p:pic>
+      <p:sp>
+        <p:nvSpPr>
+          <p:cNvPr id="16" name="Rectangle 15">
+            <a:extLst>
+              <a:ext uri="{FF2B5EF4-FFF2-40B4-BE49-F238E27FC236}">
+                <a16:creationId xmlns:a16="http://schemas.microsoft.com/office/drawing/2014/main" id="{7A008CF4-0479-089D-35D6-A156FF5AFD17}"/>
+              </a:ext>
+            </a:extLst>
+          </p:cNvPr>
+          <p:cNvSpPr/>
+          <p:nvPr/>
+        </p:nvSpPr>
+        <p:spPr>
+          <a:xfrm>
+            <a:off x="1035269" y="478221"/>
+            <a:ext cx="10857186" cy="509752"/>
+          </a:xfrm>
+          <a:prstGeom prst="rect">
+            <a:avLst/>
+          </a:prstGeom>
+          <a:solidFill>
+            <a:schemeClr val="bg1">
+              <a:lumMod val="75000"/>
+            </a:schemeClr>
+          </a:solidFill>
+        </p:spPr>
+        <p:style>
+          <a:lnRef idx="2">
+            <a:schemeClr val="accent1">
+              <a:shade val="15000"/>
+            </a:schemeClr>
+          </a:lnRef>
+          <a:fillRef idx="1">
+            <a:schemeClr val="accent1"/>
+          </a:fillRef>
+          <a:effectRef idx="0">
+            <a:schemeClr val="accent1"/>
+          </a:effectRef>
+          <a:fontRef idx="minor">
+            <a:schemeClr val="lt1"/>
+          </a:fontRef>
+        </p:style>
+        <p:txBody>
+          <a:bodyPr rtlCol="0" anchor="ctr"/>
+          <a:lstStyle/>
+          <a:p>
+            <a:pPr algn="ctr"/>
+            <a:endParaRPr lang="en-US"/>
+          </a:p>
+        </p:txBody>
+      </p:sp>
+      <p:cxnSp>
+        <p:nvCxnSpPr>
+          <p:cNvPr id="18" name="Straight Connector 17">
+            <a:extLst>
+              <a:ext uri="{FF2B5EF4-FFF2-40B4-BE49-F238E27FC236}">
+                <a16:creationId xmlns:a16="http://schemas.microsoft.com/office/drawing/2014/main" id="{46479A24-1D55-DDE5-CD74-114B6765D2E4}"/>
+              </a:ext>
+            </a:extLst>
+          </p:cNvPr>
+          <p:cNvCxnSpPr/>
+          <p:nvPr/>
+        </p:nvCxnSpPr>
+        <p:spPr>
+          <a:xfrm>
+            <a:off x="404648" y="557049"/>
+            <a:ext cx="0" cy="388883"/>
+          </a:xfrm>
+          <a:prstGeom prst="line">
+            <a:avLst/>
+          </a:prstGeom>
+          <a:ln>
+            <a:solidFill>
+              <a:schemeClr val="tx2">
+                <a:lumMod val="75000"/>
+                <a:lumOff val="25000"/>
+              </a:schemeClr>
+            </a:solidFill>
+          </a:ln>
+        </p:spPr>
+        <p:style>
+          <a:lnRef idx="2">
+            <a:schemeClr val="accent4"/>
+          </a:lnRef>
+          <a:fillRef idx="0">
+            <a:schemeClr val="accent4"/>
+          </a:fillRef>
+          <a:effectRef idx="1">
+            <a:schemeClr val="accent4"/>
+          </a:effectRef>
+          <a:fontRef idx="minor">
+            <a:schemeClr val="tx1"/>
+          </a:fontRef>
+        </p:style>
+      </p:cxnSp>
+      <p:sp>
+        <p:nvSpPr>
+          <p:cNvPr id="19" name="Rectangle 18">
+            <a:extLst>
+              <a:ext uri="{FF2B5EF4-FFF2-40B4-BE49-F238E27FC236}">
+                <a16:creationId xmlns:a16="http://schemas.microsoft.com/office/drawing/2014/main" id="{3EC8859E-3305-AF36-CFCD-11F99A690968}"/>
+              </a:ext>
+            </a:extLst>
+          </p:cNvPr>
+          <p:cNvSpPr/>
+          <p:nvPr/>
+        </p:nvSpPr>
+        <p:spPr>
+          <a:xfrm>
+            <a:off x="1108841" y="557049"/>
+            <a:ext cx="1140373" cy="320565"/>
+          </a:xfrm>
+          <a:prstGeom prst="rect">
+            <a:avLst/>
+          </a:prstGeom>
+          <a:solidFill>
+            <a:schemeClr val="accent4">
+              <a:lumMod val="75000"/>
+            </a:schemeClr>
+          </a:solidFill>
+          <a:ln>
+            <a:noFill/>
+          </a:ln>
+        </p:spPr>
+        <p:style>
+          <a:lnRef idx="2">
+            <a:schemeClr val="accent1">
+              <a:shade val="15000"/>
+            </a:schemeClr>
+          </a:lnRef>
+          <a:fillRef idx="1">
+            <a:schemeClr val="accent1"/>
+          </a:fillRef>
+          <a:effectRef idx="0">
+            <a:schemeClr val="accent1"/>
+          </a:effectRef>
+          <a:fontRef idx="minor">
+            <a:schemeClr val="lt1"/>
+          </a:fontRef>
+        </p:style>
+        <p:txBody>
+          <a:bodyPr rtlCol="0" anchor="ctr"/>
+          <a:lstStyle/>
+          <a:p>
+            <a:pPr algn="ctr"/>
+            <a:r>
+              <a:rPr lang="en-US" dirty="0"/>
+              <a:t>+New</a:t>
+            </a:r>
+          </a:p>
+        </p:txBody>
+      </p:sp>
+      <p:sp>
+        <p:nvSpPr>
+          <p:cNvPr id="20" name="Rectangle 19">
+            <a:extLst>
+              <a:ext uri="{FF2B5EF4-FFF2-40B4-BE49-F238E27FC236}">
+                <a16:creationId xmlns:a16="http://schemas.microsoft.com/office/drawing/2014/main" id="{012FFB2C-0A2C-C1C7-2737-E6C0214E227F}"/>
+              </a:ext>
+            </a:extLst>
+          </p:cNvPr>
+          <p:cNvSpPr/>
+          <p:nvPr/>
+        </p:nvSpPr>
+        <p:spPr>
+          <a:xfrm>
+            <a:off x="2427890" y="557049"/>
+            <a:ext cx="6511158" cy="320565"/>
+          </a:xfrm>
+          <a:prstGeom prst="rect">
+            <a:avLst/>
+          </a:prstGeom>
+          <a:solidFill>
+            <a:schemeClr val="bg1"/>
+          </a:solidFill>
+        </p:spPr>
+        <p:style>
+          <a:lnRef idx="2">
+            <a:schemeClr val="accent1">
+              <a:shade val="15000"/>
+            </a:schemeClr>
+          </a:lnRef>
+          <a:fillRef idx="1">
+            <a:schemeClr val="accent1"/>
+          </a:fillRef>
+          <a:effectRef idx="0">
+            <a:schemeClr val="accent1"/>
+          </a:effectRef>
+          <a:fontRef idx="minor">
+            <a:schemeClr val="lt1"/>
+          </a:fontRef>
+        </p:style>
+        <p:txBody>
+          <a:bodyPr rtlCol="0" anchor="ctr"/>
+          <a:lstStyle/>
+          <a:p>
+            <a:r>
+              <a:rPr lang="en-US" sz="1400" dirty="0">
+                <a:solidFill>
+                  <a:schemeClr val="bg1">
+                    <a:lumMod val="65000"/>
+                  </a:schemeClr>
+                </a:solidFill>
+              </a:rPr>
+              <a:t>Search for a Project…</a:t>
+            </a:r>
+          </a:p>
+        </p:txBody>
+      </p:sp>
+      <p:sp>
+        <p:nvSpPr>
+          <p:cNvPr id="21" name="Rectangle 20">
+            <a:extLst>
+              <a:ext uri="{FF2B5EF4-FFF2-40B4-BE49-F238E27FC236}">
+                <a16:creationId xmlns:a16="http://schemas.microsoft.com/office/drawing/2014/main" id="{89DEEC28-ECF9-BC5B-E2F0-6585C94246B3}"/>
+              </a:ext>
+            </a:extLst>
+          </p:cNvPr>
+          <p:cNvSpPr/>
+          <p:nvPr/>
+        </p:nvSpPr>
+        <p:spPr>
+          <a:xfrm>
+            <a:off x="9122979" y="557049"/>
+            <a:ext cx="2159876" cy="320565"/>
+          </a:xfrm>
+          <a:prstGeom prst="rect">
+            <a:avLst/>
+          </a:prstGeom>
+          <a:solidFill>
+            <a:schemeClr val="bg1"/>
+          </a:solidFill>
+        </p:spPr>
+        <p:style>
+          <a:lnRef idx="2">
+            <a:schemeClr val="accent1">
+              <a:shade val="15000"/>
+            </a:schemeClr>
+          </a:lnRef>
+          <a:fillRef idx="1">
+            <a:schemeClr val="accent1"/>
+          </a:fillRef>
+          <a:effectRef idx="0">
+            <a:schemeClr val="accent1"/>
+          </a:effectRef>
+          <a:fontRef idx="minor">
+            <a:schemeClr val="lt1"/>
+          </a:fontRef>
+        </p:style>
+        <p:txBody>
+          <a:bodyPr rtlCol="0" anchor="ctr"/>
+          <a:lstStyle/>
+          <a:p>
+            <a:r>
+              <a:rPr lang="en-US" sz="1600" dirty="0">
+                <a:solidFill>
+                  <a:schemeClr val="tx1"/>
+                </a:solidFill>
+              </a:rPr>
+              <a:t>Most Recent</a:t>
+            </a:r>
+          </a:p>
+        </p:txBody>
+      </p:sp>
+      <p:sp>
+        <p:nvSpPr>
+          <p:cNvPr id="22" name="Isosceles Triangle 21">
+            <a:extLst>
+              <a:ext uri="{FF2B5EF4-FFF2-40B4-BE49-F238E27FC236}">
+                <a16:creationId xmlns:a16="http://schemas.microsoft.com/office/drawing/2014/main" id="{C1462E8C-73BF-1576-3A6D-E7F205CDDC44}"/>
+              </a:ext>
+            </a:extLst>
+          </p:cNvPr>
+          <p:cNvSpPr/>
+          <p:nvPr/>
+        </p:nvSpPr>
+        <p:spPr>
+          <a:xfrm rot="10800000">
+            <a:off x="10988566" y="651642"/>
+            <a:ext cx="178676" cy="157655"/>
+          </a:xfrm>
+          <a:prstGeom prst="triangle">
+            <a:avLst/>
+          </a:prstGeom>
+          <a:solidFill>
+            <a:schemeClr val="bg1"/>
+          </a:solidFill>
+          <a:ln>
+            <a:solidFill>
+              <a:schemeClr val="tx1"/>
+            </a:solidFill>
+          </a:ln>
+        </p:spPr>
+        <p:style>
+          <a:lnRef idx="2">
+            <a:schemeClr val="accent1">
+              <a:shade val="15000"/>
+            </a:schemeClr>
+          </a:lnRef>
+          <a:fillRef idx="1">
+            <a:schemeClr val="accent1"/>
+          </a:fillRef>
+          <a:effectRef idx="0">
+            <a:schemeClr val="accent1"/>
+          </a:effectRef>
+          <a:fontRef idx="minor">
+            <a:schemeClr val="lt1"/>
+          </a:fontRef>
+        </p:style>
+        <p:txBody>
+          <a:bodyPr rtlCol="0" anchor="ctr"/>
+          <a:lstStyle/>
+          <a:p>
+            <a:pPr algn="ctr"/>
+            <a:endParaRPr lang="en-US"/>
+          </a:p>
+        </p:txBody>
+      </p:sp>
+      <p:sp>
+        <p:nvSpPr>
+          <p:cNvPr id="23" name="Rectangle 22">
+            <a:extLst>
+              <a:ext uri="{FF2B5EF4-FFF2-40B4-BE49-F238E27FC236}">
+                <a16:creationId xmlns:a16="http://schemas.microsoft.com/office/drawing/2014/main" id="{C5B2C8F7-88F6-3A71-B641-562D1BBC4696}"/>
+              </a:ext>
+            </a:extLst>
+          </p:cNvPr>
+          <p:cNvSpPr/>
+          <p:nvPr/>
+        </p:nvSpPr>
+        <p:spPr>
+          <a:xfrm>
+            <a:off x="1555531" y="1576552"/>
+            <a:ext cx="2942897" cy="1439917"/>
+          </a:xfrm>
+          <a:prstGeom prst="rect">
+            <a:avLst/>
+          </a:prstGeom>
+          <a:solidFill>
+            <a:schemeClr val="accent4">
+              <a:lumMod val="75000"/>
+            </a:schemeClr>
+          </a:solidFill>
+        </p:spPr>
+        <p:style>
+          <a:lnRef idx="2">
+            <a:schemeClr val="accent1">
+              <a:shade val="15000"/>
+            </a:schemeClr>
+          </a:lnRef>
+          <a:fillRef idx="1">
+            <a:schemeClr val="accent1"/>
+          </a:fillRef>
+          <a:effectRef idx="0">
+            <a:schemeClr val="accent1"/>
+          </a:effectRef>
+          <a:fontRef idx="minor">
+            <a:schemeClr val="lt1"/>
+          </a:fontRef>
+        </p:style>
+        <p:txBody>
+          <a:bodyPr rtlCol="0" anchor="t"/>
+          <a:lstStyle/>
+          <a:p>
+            <a:pPr algn="ctr"/>
+            <a:r>
+              <a:rPr lang="en-US" dirty="0"/>
+              <a:t>Project 1: </a:t>
+            </a:r>
+          </a:p>
+        </p:txBody>
+      </p:sp>
+      <p:sp>
+        <p:nvSpPr>
+          <p:cNvPr id="24" name="Rectangle 23">
+            <a:extLst>
+              <a:ext uri="{FF2B5EF4-FFF2-40B4-BE49-F238E27FC236}">
+                <a16:creationId xmlns:a16="http://schemas.microsoft.com/office/drawing/2014/main" id="{ED412248-6E0C-3A5C-D843-39C8C08E3BB1}"/>
+              </a:ext>
+            </a:extLst>
+          </p:cNvPr>
+          <p:cNvSpPr/>
+          <p:nvPr/>
+        </p:nvSpPr>
+        <p:spPr>
+          <a:xfrm>
+            <a:off x="1555531" y="1907628"/>
+            <a:ext cx="2942897" cy="1145627"/>
+          </a:xfrm>
+          <a:prstGeom prst="rect">
+            <a:avLst/>
+          </a:prstGeom>
+          <a:solidFill>
+            <a:schemeClr val="bg1">
+              <a:lumMod val="85000"/>
+            </a:schemeClr>
+          </a:solidFill>
+        </p:spPr>
+        <p:style>
+          <a:lnRef idx="2">
+            <a:schemeClr val="accent1">
+              <a:shade val="15000"/>
+            </a:schemeClr>
+          </a:lnRef>
+          <a:fillRef idx="1">
+            <a:schemeClr val="accent1"/>
+          </a:fillRef>
+          <a:effectRef idx="0">
+            <a:schemeClr val="accent1"/>
+          </a:effectRef>
+          <a:fontRef idx="minor">
+            <a:schemeClr val="lt1"/>
+          </a:fontRef>
+        </p:style>
+        <p:txBody>
+          <a:bodyPr rtlCol="0" anchor="b"/>
+          <a:lstStyle/>
+          <a:p>
+            <a:pPr algn="ctr"/>
+            <a:r>
+              <a:rPr lang="en-US" b="0" i="0" dirty="0">
+                <a:solidFill>
+                  <a:srgbClr val="646B6B"/>
+                </a:solidFill>
+                <a:effectLst/>
+                <a:latin typeface="fontSerif"/>
+              </a:rPr>
+              <a:t>Lorem ipsum dolor sit </a:t>
+            </a:r>
+            <a:r>
+              <a:rPr lang="en-US" b="0" i="0" dirty="0" err="1">
+                <a:solidFill>
+                  <a:srgbClr val="646B6B"/>
+                </a:solidFill>
+                <a:effectLst/>
+                <a:latin typeface="fontSerif"/>
+              </a:rPr>
+              <a:t>amet</a:t>
+            </a:r>
+            <a:r>
+              <a:rPr lang="en-US" b="0" i="0" dirty="0">
+                <a:solidFill>
+                  <a:srgbClr val="646B6B"/>
+                </a:solidFill>
+                <a:effectLst/>
+                <a:latin typeface="fontSerif"/>
+              </a:rPr>
+              <a:t>, </a:t>
+            </a:r>
+            <a:r>
+              <a:rPr lang="en-US" b="0" i="0" dirty="0" err="1">
+                <a:solidFill>
+                  <a:srgbClr val="646B6B"/>
+                </a:solidFill>
+                <a:effectLst/>
+                <a:latin typeface="fontSerif"/>
+              </a:rPr>
+              <a:t>consectetur</a:t>
+            </a:r>
+            <a:r>
+              <a:rPr lang="en-US" b="0" i="0" dirty="0">
+                <a:solidFill>
+                  <a:srgbClr val="646B6B"/>
+                </a:solidFill>
+                <a:effectLst/>
+                <a:latin typeface="fontSerif"/>
+              </a:rPr>
+              <a:t> </a:t>
+            </a:r>
+            <a:r>
+              <a:rPr lang="en-US" b="0" i="0" dirty="0" err="1">
+                <a:solidFill>
+                  <a:srgbClr val="646B6B"/>
+                </a:solidFill>
+                <a:effectLst/>
+                <a:latin typeface="fontSerif"/>
+              </a:rPr>
+              <a:t>adipiscing</a:t>
+            </a:r>
+            <a:r>
+              <a:rPr lang="en-US" b="0" i="0" dirty="0">
+                <a:solidFill>
+                  <a:srgbClr val="646B6B"/>
+                </a:solidFill>
+                <a:effectLst/>
+                <a:latin typeface="fontSerif"/>
+              </a:rPr>
+              <a:t> </a:t>
+            </a:r>
+            <a:r>
+              <a:rPr lang="en-US" b="0" i="0" dirty="0" err="1">
+                <a:solidFill>
+                  <a:srgbClr val="646B6B"/>
+                </a:solidFill>
+                <a:effectLst/>
+                <a:latin typeface="fontSerif"/>
+              </a:rPr>
+              <a:t>elit</a:t>
+            </a:r>
+            <a:r>
+              <a:rPr lang="en-US" b="0" i="0" dirty="0">
+                <a:solidFill>
+                  <a:srgbClr val="646B6B"/>
+                </a:solidFill>
+                <a:effectLst/>
+                <a:latin typeface="fontSerif"/>
+              </a:rPr>
+              <a:t>, sed do </a:t>
+            </a:r>
+            <a:r>
+              <a:rPr lang="en-US" b="0" i="0" dirty="0" err="1">
+                <a:solidFill>
+                  <a:srgbClr val="646B6B"/>
+                </a:solidFill>
+                <a:effectLst/>
+                <a:latin typeface="fontSerif"/>
+              </a:rPr>
+              <a:t>eiusmod</a:t>
+            </a:r>
+            <a:r>
+              <a:rPr lang="en-US" b="0" i="0" dirty="0">
+                <a:solidFill>
+                  <a:srgbClr val="646B6B"/>
+                </a:solidFill>
+                <a:effectLst/>
+                <a:latin typeface="fontSerif"/>
+              </a:rPr>
+              <a:t> </a:t>
+            </a:r>
+            <a:r>
+              <a:rPr lang="en-US" b="0" i="0" dirty="0" err="1">
+                <a:solidFill>
+                  <a:srgbClr val="646B6B"/>
+                </a:solidFill>
+                <a:effectLst/>
+                <a:latin typeface="fontSerif"/>
+              </a:rPr>
+              <a:t>tempor</a:t>
+            </a:r>
+            <a:endParaRPr lang="en-US" dirty="0">
+              <a:solidFill>
+                <a:schemeClr val="tx1">
+                  <a:lumMod val="95000"/>
+                  <a:lumOff val="5000"/>
+                </a:schemeClr>
+              </a:solidFill>
+            </a:endParaRPr>
+          </a:p>
+        </p:txBody>
+      </p:sp>
+      <p:sp>
+        <p:nvSpPr>
+          <p:cNvPr id="25" name="Rectangle 24">
+            <a:extLst>
+              <a:ext uri="{FF2B5EF4-FFF2-40B4-BE49-F238E27FC236}">
+                <a16:creationId xmlns:a16="http://schemas.microsoft.com/office/drawing/2014/main" id="{AB737A5B-4856-9FEC-D5F1-4EC3268B7A5E}"/>
+              </a:ext>
+            </a:extLst>
+          </p:cNvPr>
+          <p:cNvSpPr/>
+          <p:nvPr/>
+        </p:nvSpPr>
+        <p:spPr>
+          <a:xfrm>
+            <a:off x="4992413" y="1592318"/>
+            <a:ext cx="2942897" cy="1439917"/>
+          </a:xfrm>
+          <a:prstGeom prst="rect">
+            <a:avLst/>
+          </a:prstGeom>
+          <a:solidFill>
+            <a:schemeClr val="accent4">
+              <a:lumMod val="75000"/>
+            </a:schemeClr>
+          </a:solidFill>
+        </p:spPr>
+        <p:style>
+          <a:lnRef idx="2">
+            <a:schemeClr val="accent1">
+              <a:shade val="15000"/>
+            </a:schemeClr>
+          </a:lnRef>
+          <a:fillRef idx="1">
+            <a:schemeClr val="accent1"/>
+          </a:fillRef>
+          <a:effectRef idx="0">
+            <a:schemeClr val="accent1"/>
+          </a:effectRef>
+          <a:fontRef idx="minor">
+            <a:schemeClr val="lt1"/>
+          </a:fontRef>
+        </p:style>
+        <p:txBody>
+          <a:bodyPr rtlCol="0" anchor="t"/>
+          <a:lstStyle/>
+          <a:p>
+            <a:pPr algn="ctr"/>
+            <a:r>
+              <a:rPr lang="en-US" dirty="0"/>
+              <a:t>Project 2: </a:t>
+            </a:r>
+          </a:p>
+        </p:txBody>
+      </p:sp>
+      <p:sp>
+        <p:nvSpPr>
+          <p:cNvPr id="26" name="Rectangle 25">
+            <a:extLst>
+              <a:ext uri="{FF2B5EF4-FFF2-40B4-BE49-F238E27FC236}">
+                <a16:creationId xmlns:a16="http://schemas.microsoft.com/office/drawing/2014/main" id="{75D44B97-D60F-FC86-F164-6FA19A6DC54E}"/>
+              </a:ext>
+            </a:extLst>
+          </p:cNvPr>
+          <p:cNvSpPr/>
+          <p:nvPr/>
+        </p:nvSpPr>
+        <p:spPr>
+          <a:xfrm>
+            <a:off x="4992413" y="1923394"/>
+            <a:ext cx="2942897" cy="1145627"/>
+          </a:xfrm>
+          <a:prstGeom prst="rect">
+            <a:avLst/>
+          </a:prstGeom>
+          <a:solidFill>
+            <a:schemeClr val="bg1">
+              <a:lumMod val="85000"/>
+            </a:schemeClr>
+          </a:solidFill>
+        </p:spPr>
+        <p:style>
+          <a:lnRef idx="2">
+            <a:schemeClr val="accent1">
+              <a:shade val="15000"/>
+            </a:schemeClr>
+          </a:lnRef>
+          <a:fillRef idx="1">
+            <a:schemeClr val="accent1"/>
+          </a:fillRef>
+          <a:effectRef idx="0">
+            <a:schemeClr val="accent1"/>
+          </a:effectRef>
+          <a:fontRef idx="minor">
+            <a:schemeClr val="lt1"/>
+          </a:fontRef>
+        </p:style>
+        <p:txBody>
+          <a:bodyPr rtlCol="0" anchor="b"/>
+          <a:lstStyle/>
+          <a:p>
+            <a:pPr algn="ctr"/>
+            <a:r>
+              <a:rPr lang="en-US" b="0" i="0" dirty="0">
+                <a:solidFill>
+                  <a:srgbClr val="646B6B"/>
+                </a:solidFill>
+                <a:effectLst/>
+                <a:latin typeface="fontSerif"/>
+              </a:rPr>
+              <a:t>Lorem ipsum dolor sit </a:t>
+            </a:r>
+            <a:r>
+              <a:rPr lang="en-US" b="0" i="0" dirty="0" err="1">
+                <a:solidFill>
+                  <a:srgbClr val="646B6B"/>
+                </a:solidFill>
+                <a:effectLst/>
+                <a:latin typeface="fontSerif"/>
+              </a:rPr>
+              <a:t>amet</a:t>
+            </a:r>
+            <a:r>
+              <a:rPr lang="en-US" b="0" i="0" dirty="0">
+                <a:solidFill>
+                  <a:srgbClr val="646B6B"/>
+                </a:solidFill>
+                <a:effectLst/>
+                <a:latin typeface="fontSerif"/>
+              </a:rPr>
+              <a:t>, </a:t>
+            </a:r>
+            <a:r>
+              <a:rPr lang="en-US" b="0" i="0" dirty="0" err="1">
+                <a:solidFill>
+                  <a:srgbClr val="646B6B"/>
+                </a:solidFill>
+                <a:effectLst/>
+                <a:latin typeface="fontSerif"/>
+              </a:rPr>
+              <a:t>consectetur</a:t>
+            </a:r>
+            <a:r>
+              <a:rPr lang="en-US" b="0" i="0" dirty="0">
+                <a:solidFill>
+                  <a:srgbClr val="646B6B"/>
+                </a:solidFill>
+                <a:effectLst/>
+                <a:latin typeface="fontSerif"/>
+              </a:rPr>
+              <a:t> </a:t>
+            </a:r>
+            <a:r>
+              <a:rPr lang="en-US" b="0" i="0" dirty="0" err="1">
+                <a:solidFill>
+                  <a:srgbClr val="646B6B"/>
+                </a:solidFill>
+                <a:effectLst/>
+                <a:latin typeface="fontSerif"/>
+              </a:rPr>
+              <a:t>adipiscing</a:t>
+            </a:r>
+            <a:r>
+              <a:rPr lang="en-US" b="0" i="0" dirty="0">
+                <a:solidFill>
+                  <a:srgbClr val="646B6B"/>
+                </a:solidFill>
+                <a:effectLst/>
+                <a:latin typeface="fontSerif"/>
+              </a:rPr>
+              <a:t> </a:t>
+            </a:r>
+            <a:r>
+              <a:rPr lang="en-US" b="0" i="0" dirty="0" err="1">
+                <a:solidFill>
+                  <a:srgbClr val="646B6B"/>
+                </a:solidFill>
+                <a:effectLst/>
+                <a:latin typeface="fontSerif"/>
+              </a:rPr>
+              <a:t>elit</a:t>
+            </a:r>
+            <a:r>
+              <a:rPr lang="en-US" b="0" i="0" dirty="0">
+                <a:solidFill>
+                  <a:srgbClr val="646B6B"/>
+                </a:solidFill>
+                <a:effectLst/>
+                <a:latin typeface="fontSerif"/>
+              </a:rPr>
+              <a:t>, sed do </a:t>
+            </a:r>
+            <a:r>
+              <a:rPr lang="en-US" b="0" i="0" dirty="0" err="1">
+                <a:solidFill>
+                  <a:srgbClr val="646B6B"/>
+                </a:solidFill>
+                <a:effectLst/>
+                <a:latin typeface="fontSerif"/>
+              </a:rPr>
+              <a:t>eiusmod</a:t>
+            </a:r>
+            <a:r>
+              <a:rPr lang="en-US" b="0" i="0" dirty="0">
+                <a:solidFill>
+                  <a:srgbClr val="646B6B"/>
+                </a:solidFill>
+                <a:effectLst/>
+                <a:latin typeface="fontSerif"/>
+              </a:rPr>
+              <a:t> </a:t>
+            </a:r>
+            <a:r>
+              <a:rPr lang="en-US" b="0" i="0" dirty="0" err="1">
+                <a:solidFill>
+                  <a:srgbClr val="646B6B"/>
+                </a:solidFill>
+                <a:effectLst/>
+                <a:latin typeface="fontSerif"/>
+              </a:rPr>
+              <a:t>tempor</a:t>
+            </a:r>
+            <a:endParaRPr lang="en-US" dirty="0">
+              <a:solidFill>
+                <a:schemeClr val="tx1">
+                  <a:lumMod val="95000"/>
+                  <a:lumOff val="5000"/>
+                </a:schemeClr>
+              </a:solidFill>
+            </a:endParaRPr>
+          </a:p>
+        </p:txBody>
+      </p:sp>
+      <p:sp>
+        <p:nvSpPr>
+          <p:cNvPr id="27" name="Rectangle 26">
+            <a:extLst>
+              <a:ext uri="{FF2B5EF4-FFF2-40B4-BE49-F238E27FC236}">
+                <a16:creationId xmlns:a16="http://schemas.microsoft.com/office/drawing/2014/main" id="{CE54C830-0281-553E-1709-02354A796C44}"/>
+              </a:ext>
+            </a:extLst>
+          </p:cNvPr>
+          <p:cNvSpPr/>
+          <p:nvPr/>
+        </p:nvSpPr>
+        <p:spPr>
+          <a:xfrm>
+            <a:off x="8429295" y="1592318"/>
+            <a:ext cx="2942897" cy="1439917"/>
+          </a:xfrm>
+          <a:prstGeom prst="rect">
+            <a:avLst/>
+          </a:prstGeom>
+          <a:solidFill>
+            <a:schemeClr val="accent4">
+              <a:lumMod val="75000"/>
+            </a:schemeClr>
+          </a:solidFill>
+        </p:spPr>
+        <p:style>
+          <a:lnRef idx="2">
+            <a:schemeClr val="accent1">
+              <a:shade val="15000"/>
+            </a:schemeClr>
+          </a:lnRef>
+          <a:fillRef idx="1">
+            <a:schemeClr val="accent1"/>
+          </a:fillRef>
+          <a:effectRef idx="0">
+            <a:schemeClr val="accent1"/>
+          </a:effectRef>
+          <a:fontRef idx="minor">
+            <a:schemeClr val="lt1"/>
+          </a:fontRef>
+        </p:style>
+        <p:txBody>
+          <a:bodyPr rtlCol="0" anchor="t"/>
+          <a:lstStyle/>
+          <a:p>
+            <a:pPr algn="ctr"/>
+            <a:r>
+              <a:rPr lang="en-US" dirty="0"/>
+              <a:t>Project 3: </a:t>
+            </a:r>
+          </a:p>
+        </p:txBody>
+      </p:sp>
+      <p:sp>
+        <p:nvSpPr>
+          <p:cNvPr id="28" name="Rectangle 27">
+            <a:extLst>
+              <a:ext uri="{FF2B5EF4-FFF2-40B4-BE49-F238E27FC236}">
+                <a16:creationId xmlns:a16="http://schemas.microsoft.com/office/drawing/2014/main" id="{25DA6550-7832-3220-51F1-0C2F27A6AD7C}"/>
+              </a:ext>
+            </a:extLst>
+          </p:cNvPr>
+          <p:cNvSpPr/>
+          <p:nvPr/>
+        </p:nvSpPr>
+        <p:spPr>
+          <a:xfrm>
+            <a:off x="8429295" y="1923394"/>
+            <a:ext cx="2942897" cy="1145627"/>
+          </a:xfrm>
+          <a:prstGeom prst="rect">
+            <a:avLst/>
+          </a:prstGeom>
+          <a:solidFill>
+            <a:schemeClr val="bg1">
+              <a:lumMod val="85000"/>
+            </a:schemeClr>
+          </a:solidFill>
+        </p:spPr>
+        <p:style>
+          <a:lnRef idx="2">
+            <a:schemeClr val="accent1">
+              <a:shade val="15000"/>
+            </a:schemeClr>
+          </a:lnRef>
+          <a:fillRef idx="1">
+            <a:schemeClr val="accent1"/>
+          </a:fillRef>
+          <a:effectRef idx="0">
+            <a:schemeClr val="accent1"/>
+          </a:effectRef>
+          <a:fontRef idx="minor">
+            <a:schemeClr val="lt1"/>
+          </a:fontRef>
+        </p:style>
+        <p:txBody>
+          <a:bodyPr rtlCol="0" anchor="b"/>
+          <a:lstStyle/>
+          <a:p>
+            <a:pPr algn="ctr"/>
+            <a:r>
+              <a:rPr lang="en-US" b="0" i="0" dirty="0">
+                <a:solidFill>
+                  <a:srgbClr val="646B6B"/>
+                </a:solidFill>
+                <a:effectLst/>
+                <a:latin typeface="fontSerif"/>
+              </a:rPr>
+              <a:t>Lorem ipsum dolor sit </a:t>
+            </a:r>
+            <a:r>
+              <a:rPr lang="en-US" b="0" i="0" dirty="0" err="1">
+                <a:solidFill>
+                  <a:srgbClr val="646B6B"/>
+                </a:solidFill>
+                <a:effectLst/>
+                <a:latin typeface="fontSerif"/>
+              </a:rPr>
+              <a:t>amet</a:t>
+            </a:r>
+            <a:r>
+              <a:rPr lang="en-US" b="0" i="0" dirty="0">
+                <a:solidFill>
+                  <a:srgbClr val="646B6B"/>
+                </a:solidFill>
+                <a:effectLst/>
+                <a:latin typeface="fontSerif"/>
+              </a:rPr>
+              <a:t>, </a:t>
+            </a:r>
+            <a:r>
+              <a:rPr lang="en-US" b="0" i="0" dirty="0" err="1">
+                <a:solidFill>
+                  <a:srgbClr val="646B6B"/>
+                </a:solidFill>
+                <a:effectLst/>
+                <a:latin typeface="fontSerif"/>
+              </a:rPr>
+              <a:t>consectetur</a:t>
+            </a:r>
+            <a:r>
+              <a:rPr lang="en-US" b="0" i="0" dirty="0">
+                <a:solidFill>
+                  <a:srgbClr val="646B6B"/>
+                </a:solidFill>
+                <a:effectLst/>
+                <a:latin typeface="fontSerif"/>
+              </a:rPr>
+              <a:t> </a:t>
+            </a:r>
+            <a:r>
+              <a:rPr lang="en-US" b="0" i="0" dirty="0" err="1">
+                <a:solidFill>
+                  <a:srgbClr val="646B6B"/>
+                </a:solidFill>
+                <a:effectLst/>
+                <a:latin typeface="fontSerif"/>
+              </a:rPr>
+              <a:t>adipiscing</a:t>
+            </a:r>
+            <a:r>
+              <a:rPr lang="en-US" b="0" i="0" dirty="0">
+                <a:solidFill>
+                  <a:srgbClr val="646B6B"/>
+                </a:solidFill>
+                <a:effectLst/>
+                <a:latin typeface="fontSerif"/>
+              </a:rPr>
+              <a:t> </a:t>
+            </a:r>
+            <a:r>
+              <a:rPr lang="en-US" b="0" i="0" dirty="0" err="1">
+                <a:solidFill>
+                  <a:srgbClr val="646B6B"/>
+                </a:solidFill>
+                <a:effectLst/>
+                <a:latin typeface="fontSerif"/>
+              </a:rPr>
+              <a:t>elit</a:t>
+            </a:r>
+            <a:r>
+              <a:rPr lang="en-US" b="0" i="0" dirty="0">
+                <a:solidFill>
+                  <a:srgbClr val="646B6B"/>
+                </a:solidFill>
+                <a:effectLst/>
+                <a:latin typeface="fontSerif"/>
+              </a:rPr>
+              <a:t>, sed do </a:t>
+            </a:r>
+            <a:r>
+              <a:rPr lang="en-US" b="0" i="0" dirty="0" err="1">
+                <a:solidFill>
+                  <a:srgbClr val="646B6B"/>
+                </a:solidFill>
+                <a:effectLst/>
+                <a:latin typeface="fontSerif"/>
+              </a:rPr>
+              <a:t>eiusmod</a:t>
+            </a:r>
+            <a:r>
+              <a:rPr lang="en-US" b="0" i="0" dirty="0">
+                <a:solidFill>
+                  <a:srgbClr val="646B6B"/>
+                </a:solidFill>
+                <a:effectLst/>
+                <a:latin typeface="fontSerif"/>
+              </a:rPr>
+              <a:t> </a:t>
+            </a:r>
+            <a:r>
+              <a:rPr lang="en-US" b="0" i="0" dirty="0" err="1">
+                <a:solidFill>
+                  <a:srgbClr val="646B6B"/>
+                </a:solidFill>
+                <a:effectLst/>
+                <a:latin typeface="fontSerif"/>
+              </a:rPr>
+              <a:t>tempor</a:t>
+            </a:r>
+            <a:endParaRPr lang="en-US" dirty="0">
+              <a:solidFill>
+                <a:schemeClr val="tx1">
+                  <a:lumMod val="95000"/>
+                  <a:lumOff val="5000"/>
+                </a:schemeClr>
+              </a:solidFill>
+            </a:endParaRPr>
           </a:p>
         </p:txBody>
       </p:sp>
@@ -3462,6 +4832,1075 @@
     <p:extLst>
       <p:ext uri="{BB962C8B-B14F-4D97-AF65-F5344CB8AC3E}">
         <p14:creationId xmlns:p14="http://schemas.microsoft.com/office/powerpoint/2010/main" val="1111375173"/>
+      </p:ext>
+    </p:extLst>
+  </p:cSld>
+  <p:clrMapOvr>
+    <a:masterClrMapping/>
+  </p:clrMapOvr>
+</p:sld>
+</file>
+
+<file path=ppt/slides/slide3.xml><?xml version="1.0" encoding="utf-8"?>
+<p:sld xmlns:a="http://schemas.openxmlformats.org/drawingml/2006/main" xmlns:r="http://schemas.openxmlformats.org/officeDocument/2006/relationships" xmlns:p="http://schemas.openxmlformats.org/presentationml/2006/main">
+  <p:cSld>
+    <p:spTree>
+      <p:nvGrpSpPr>
+        <p:cNvPr id="1" name="">
+          <a:extLst>
+            <a:ext uri="{FF2B5EF4-FFF2-40B4-BE49-F238E27FC236}">
+              <a16:creationId xmlns:a16="http://schemas.microsoft.com/office/drawing/2014/main" id="{EF22E0B5-CDB5-0EB5-F69B-11B712538AF5}"/>
+            </a:ext>
+          </a:extLst>
+        </p:cNvPr>
+        <p:cNvGrpSpPr/>
+        <p:nvPr/>
+      </p:nvGrpSpPr>
+      <p:grpSpPr>
+        <a:xfrm>
+          <a:off x="0" y="0"/>
+          <a:ext cx="0" cy="0"/>
+          <a:chOff x="0" y="0"/>
+          <a:chExt cx="0" cy="0"/>
+        </a:xfrm>
+      </p:grpSpPr>
+      <p:sp>
+        <p:nvSpPr>
+          <p:cNvPr id="4" name="Rectangle 3">
+            <a:extLst>
+              <a:ext uri="{FF2B5EF4-FFF2-40B4-BE49-F238E27FC236}">
+                <a16:creationId xmlns:a16="http://schemas.microsoft.com/office/drawing/2014/main" id="{32E6E165-A9C8-B9FA-401E-16A54094D318}"/>
+              </a:ext>
+            </a:extLst>
+          </p:cNvPr>
+          <p:cNvSpPr/>
+          <p:nvPr/>
+        </p:nvSpPr>
+        <p:spPr>
+          <a:xfrm>
+            <a:off x="357352" y="478221"/>
+            <a:ext cx="11535103" cy="6074979"/>
+          </a:xfrm>
+          <a:prstGeom prst="rect">
+            <a:avLst/>
+          </a:prstGeom>
+          <a:solidFill>
+            <a:schemeClr val="bg1">
+              <a:lumMod val="95000"/>
+            </a:schemeClr>
+          </a:solidFill>
+        </p:spPr>
+        <p:style>
+          <a:lnRef idx="2">
+            <a:schemeClr val="accent4">
+              <a:shade val="15000"/>
+            </a:schemeClr>
+          </a:lnRef>
+          <a:fillRef idx="1">
+            <a:schemeClr val="accent4"/>
+          </a:fillRef>
+          <a:effectRef idx="0">
+            <a:schemeClr val="accent4"/>
+          </a:effectRef>
+          <a:fontRef idx="minor">
+            <a:schemeClr val="lt1"/>
+          </a:fontRef>
+        </p:style>
+        <p:txBody>
+          <a:bodyPr rtlCol="0" anchor="ctr"/>
+          <a:lstStyle/>
+          <a:p>
+            <a:pPr algn="ctr"/>
+            <a:endParaRPr lang="en-US" dirty="0"/>
+          </a:p>
+        </p:txBody>
+      </p:sp>
+      <p:sp>
+        <p:nvSpPr>
+          <p:cNvPr id="5" name="Rectangle 4">
+            <a:extLst>
+              <a:ext uri="{FF2B5EF4-FFF2-40B4-BE49-F238E27FC236}">
+                <a16:creationId xmlns:a16="http://schemas.microsoft.com/office/drawing/2014/main" id="{9E125C09-9E39-4154-5591-C4774BEA2272}"/>
+              </a:ext>
+            </a:extLst>
+          </p:cNvPr>
+          <p:cNvSpPr/>
+          <p:nvPr/>
+        </p:nvSpPr>
+        <p:spPr>
+          <a:xfrm>
+            <a:off x="357352" y="304800"/>
+            <a:ext cx="11535103" cy="173421"/>
+          </a:xfrm>
+          <a:prstGeom prst="rect">
+            <a:avLst/>
+          </a:prstGeom>
+          <a:solidFill>
+            <a:schemeClr val="accent1"/>
+          </a:solidFill>
+        </p:spPr>
+        <p:style>
+          <a:lnRef idx="2">
+            <a:schemeClr val="dk1"/>
+          </a:lnRef>
+          <a:fillRef idx="1">
+            <a:schemeClr val="lt1"/>
+          </a:fillRef>
+          <a:effectRef idx="0">
+            <a:schemeClr val="dk1"/>
+          </a:effectRef>
+          <a:fontRef idx="minor">
+            <a:schemeClr val="dk1"/>
+          </a:fontRef>
+        </p:style>
+        <p:txBody>
+          <a:bodyPr rtlCol="0" anchor="ctr"/>
+          <a:lstStyle/>
+          <a:p>
+            <a:pPr algn="ctr"/>
+            <a:endParaRPr lang="en-US"/>
+          </a:p>
+        </p:txBody>
+      </p:sp>
+      <p:sp>
+        <p:nvSpPr>
+          <p:cNvPr id="6" name="Rectangle 5">
+            <a:extLst>
+              <a:ext uri="{FF2B5EF4-FFF2-40B4-BE49-F238E27FC236}">
+                <a16:creationId xmlns:a16="http://schemas.microsoft.com/office/drawing/2014/main" id="{61744941-D13E-EE4D-7678-82969B6FBDAB}"/>
+              </a:ext>
+            </a:extLst>
+          </p:cNvPr>
+          <p:cNvSpPr/>
+          <p:nvPr/>
+        </p:nvSpPr>
+        <p:spPr>
+          <a:xfrm>
+            <a:off x="11719034" y="304800"/>
+            <a:ext cx="173421" cy="173421"/>
+          </a:xfrm>
+          <a:prstGeom prst="rect">
+            <a:avLst/>
+          </a:prstGeom>
+          <a:solidFill>
+            <a:schemeClr val="bg1"/>
+          </a:solidFill>
+        </p:spPr>
+        <p:style>
+          <a:lnRef idx="2">
+            <a:schemeClr val="accent1">
+              <a:shade val="15000"/>
+            </a:schemeClr>
+          </a:lnRef>
+          <a:fillRef idx="1">
+            <a:schemeClr val="accent1"/>
+          </a:fillRef>
+          <a:effectRef idx="0">
+            <a:schemeClr val="accent1"/>
+          </a:effectRef>
+          <a:fontRef idx="minor">
+            <a:schemeClr val="lt1"/>
+          </a:fontRef>
+        </p:style>
+        <p:txBody>
+          <a:bodyPr rtlCol="0" anchor="ctr"/>
+          <a:lstStyle/>
+          <a:p>
+            <a:pPr algn="ctr"/>
+            <a:r>
+              <a:rPr lang="en-US" sz="1200" dirty="0">
+                <a:solidFill>
+                  <a:schemeClr val="tx1"/>
+                </a:solidFill>
+              </a:rPr>
+              <a:t>X</a:t>
+            </a:r>
+          </a:p>
+        </p:txBody>
+      </p:sp>
+      <p:sp>
+        <p:nvSpPr>
+          <p:cNvPr id="7" name="Rectangle 6">
+            <a:extLst>
+              <a:ext uri="{FF2B5EF4-FFF2-40B4-BE49-F238E27FC236}">
+                <a16:creationId xmlns:a16="http://schemas.microsoft.com/office/drawing/2014/main" id="{A05CD14B-4B75-0CC8-7E08-318DF460B181}"/>
+              </a:ext>
+            </a:extLst>
+          </p:cNvPr>
+          <p:cNvSpPr/>
+          <p:nvPr/>
+        </p:nvSpPr>
+        <p:spPr>
+          <a:xfrm>
+            <a:off x="11545613" y="304800"/>
+            <a:ext cx="173421" cy="173421"/>
+          </a:xfrm>
+          <a:prstGeom prst="rect">
+            <a:avLst/>
+          </a:prstGeom>
+          <a:solidFill>
+            <a:schemeClr val="bg1"/>
+          </a:solidFill>
+        </p:spPr>
+        <p:style>
+          <a:lnRef idx="2">
+            <a:schemeClr val="accent1">
+              <a:shade val="15000"/>
+            </a:schemeClr>
+          </a:lnRef>
+          <a:fillRef idx="1">
+            <a:schemeClr val="accent1"/>
+          </a:fillRef>
+          <a:effectRef idx="0">
+            <a:schemeClr val="accent1"/>
+          </a:effectRef>
+          <a:fontRef idx="minor">
+            <a:schemeClr val="lt1"/>
+          </a:fontRef>
+        </p:style>
+        <p:txBody>
+          <a:bodyPr rtlCol="0" anchor="ctr"/>
+          <a:lstStyle/>
+          <a:p>
+            <a:pPr algn="ctr"/>
+            <a:r>
+              <a:rPr lang="en-US" sz="1200" dirty="0">
+                <a:solidFill>
+                  <a:schemeClr val="tx1"/>
+                </a:solidFill>
+              </a:rPr>
+              <a:t>▢</a:t>
+            </a:r>
+          </a:p>
+        </p:txBody>
+      </p:sp>
+      <p:sp>
+        <p:nvSpPr>
+          <p:cNvPr id="8" name="Rectangle 7">
+            <a:extLst>
+              <a:ext uri="{FF2B5EF4-FFF2-40B4-BE49-F238E27FC236}">
+                <a16:creationId xmlns:a16="http://schemas.microsoft.com/office/drawing/2014/main" id="{240CDE65-EB1F-7F67-3F1F-19D41561AB32}"/>
+              </a:ext>
+            </a:extLst>
+          </p:cNvPr>
+          <p:cNvSpPr/>
+          <p:nvPr/>
+        </p:nvSpPr>
+        <p:spPr>
+          <a:xfrm>
+            <a:off x="11377447" y="304800"/>
+            <a:ext cx="173421" cy="173421"/>
+          </a:xfrm>
+          <a:prstGeom prst="rect">
+            <a:avLst/>
+          </a:prstGeom>
+          <a:solidFill>
+            <a:schemeClr val="bg1"/>
+          </a:solidFill>
+        </p:spPr>
+        <p:style>
+          <a:lnRef idx="2">
+            <a:schemeClr val="accent1">
+              <a:shade val="15000"/>
+            </a:schemeClr>
+          </a:lnRef>
+          <a:fillRef idx="1">
+            <a:schemeClr val="accent1"/>
+          </a:fillRef>
+          <a:effectRef idx="0">
+            <a:schemeClr val="accent1"/>
+          </a:effectRef>
+          <a:fontRef idx="minor">
+            <a:schemeClr val="lt1"/>
+          </a:fontRef>
+        </p:style>
+        <p:txBody>
+          <a:bodyPr rtlCol="0" anchor="ctr"/>
+          <a:lstStyle/>
+          <a:p>
+            <a:pPr algn="ctr"/>
+            <a:r>
+              <a:rPr lang="en-US" sz="1200" b="0" i="0" dirty="0">
+                <a:solidFill>
+                  <a:srgbClr val="001D35"/>
+                </a:solidFill>
+                <a:effectLst/>
+                <a:latin typeface="Google Sans"/>
+              </a:rPr>
+              <a:t>–</a:t>
+            </a:r>
+            <a:endParaRPr lang="en-US" sz="1200" dirty="0">
+              <a:solidFill>
+                <a:schemeClr val="tx1"/>
+              </a:solidFill>
+            </a:endParaRPr>
+          </a:p>
+        </p:txBody>
+      </p:sp>
+      <p:sp>
+        <p:nvSpPr>
+          <p:cNvPr id="9" name="Rectangle 8">
+            <a:extLst>
+              <a:ext uri="{FF2B5EF4-FFF2-40B4-BE49-F238E27FC236}">
+                <a16:creationId xmlns:a16="http://schemas.microsoft.com/office/drawing/2014/main" id="{B5066F8F-80F0-21A8-6EB7-9CC87088886C}"/>
+              </a:ext>
+            </a:extLst>
+          </p:cNvPr>
+          <p:cNvSpPr/>
+          <p:nvPr/>
+        </p:nvSpPr>
+        <p:spPr>
+          <a:xfrm>
+            <a:off x="357352" y="478221"/>
+            <a:ext cx="677917" cy="6074979"/>
+          </a:xfrm>
+          <a:prstGeom prst="rect">
+            <a:avLst/>
+          </a:prstGeom>
+          <a:solidFill>
+            <a:schemeClr val="bg1">
+              <a:lumMod val="65000"/>
+            </a:schemeClr>
+          </a:solidFill>
+        </p:spPr>
+        <p:style>
+          <a:lnRef idx="2">
+            <a:schemeClr val="accent1">
+              <a:shade val="15000"/>
+            </a:schemeClr>
+          </a:lnRef>
+          <a:fillRef idx="1">
+            <a:schemeClr val="accent1"/>
+          </a:fillRef>
+          <a:effectRef idx="0">
+            <a:schemeClr val="accent1"/>
+          </a:effectRef>
+          <a:fontRef idx="minor">
+            <a:schemeClr val="lt1"/>
+          </a:fontRef>
+        </p:style>
+        <p:txBody>
+          <a:bodyPr rtlCol="0" anchor="ctr"/>
+          <a:lstStyle/>
+          <a:p>
+            <a:pPr algn="ctr"/>
+            <a:endParaRPr lang="en-US">
+              <a:solidFill>
+                <a:schemeClr val="tx1"/>
+              </a:solidFill>
+            </a:endParaRPr>
+          </a:p>
+        </p:txBody>
+      </p:sp>
+      <p:pic>
+        <p:nvPicPr>
+          <p:cNvPr id="11" name="Graphic 10">
+            <a:extLst>
+              <a:ext uri="{FF2B5EF4-FFF2-40B4-BE49-F238E27FC236}">
+                <a16:creationId xmlns:a16="http://schemas.microsoft.com/office/drawing/2014/main" id="{C01C8502-2916-BF68-7233-329C453B3EB8}"/>
+              </a:ext>
+            </a:extLst>
+          </p:cNvPr>
+          <p:cNvPicPr>
+            <a:picLocks noChangeAspect="1"/>
+          </p:cNvPicPr>
+          <p:nvPr/>
+        </p:nvPicPr>
+        <p:blipFill>
+          <a:blip r:embed="rId2">
+            <a:extLst>
+              <a:ext uri="{96DAC541-7B7A-43D3-8B79-37D633B846F1}">
+                <asvg:svgBlip xmlns:asvg="http://schemas.microsoft.com/office/drawing/2016/SVG/main" r:embed="rId3"/>
+              </a:ext>
+            </a:extLst>
+          </a:blip>
+          <a:stretch>
+            <a:fillRect/>
+          </a:stretch>
+        </p:blipFill>
+        <p:spPr>
+          <a:xfrm>
+            <a:off x="461141" y="517635"/>
+            <a:ext cx="470338" cy="470338"/>
+          </a:xfrm>
+          <a:prstGeom prst="rect">
+            <a:avLst/>
+          </a:prstGeom>
+        </p:spPr>
+      </p:pic>
+      <p:pic>
+        <p:nvPicPr>
+          <p:cNvPr id="15" name="Graphic 14">
+            <a:extLst>
+              <a:ext uri="{FF2B5EF4-FFF2-40B4-BE49-F238E27FC236}">
+                <a16:creationId xmlns:a16="http://schemas.microsoft.com/office/drawing/2014/main" id="{740625FA-969D-6EE8-0A6F-A5D6407DCE3E}"/>
+              </a:ext>
+            </a:extLst>
+          </p:cNvPr>
+          <p:cNvPicPr>
+            <a:picLocks noChangeAspect="1"/>
+          </p:cNvPicPr>
+          <p:nvPr/>
+        </p:nvPicPr>
+        <p:blipFill>
+          <a:blip r:embed="rId4">
+            <a:extLst>
+              <a:ext uri="{96DAC541-7B7A-43D3-8B79-37D633B846F1}">
+                <asvg:svgBlip xmlns:asvg="http://schemas.microsoft.com/office/drawing/2016/SVG/main" r:embed="rId5"/>
+              </a:ext>
+            </a:extLst>
+          </a:blip>
+          <a:stretch>
+            <a:fillRect/>
+          </a:stretch>
+        </p:blipFill>
+        <p:spPr>
+          <a:xfrm>
+            <a:off x="461141" y="1161394"/>
+            <a:ext cx="470338" cy="470338"/>
+          </a:xfrm>
+          <a:prstGeom prst="rect">
+            <a:avLst/>
+          </a:prstGeom>
+        </p:spPr>
+      </p:pic>
+      <p:sp>
+        <p:nvSpPr>
+          <p:cNvPr id="16" name="Rectangle 15">
+            <a:extLst>
+              <a:ext uri="{FF2B5EF4-FFF2-40B4-BE49-F238E27FC236}">
+                <a16:creationId xmlns:a16="http://schemas.microsoft.com/office/drawing/2014/main" id="{FD0AD6D9-BD77-E5E0-2C2F-4C762C1123B8}"/>
+              </a:ext>
+            </a:extLst>
+          </p:cNvPr>
+          <p:cNvSpPr/>
+          <p:nvPr/>
+        </p:nvSpPr>
+        <p:spPr>
+          <a:xfrm>
+            <a:off x="1035269" y="478221"/>
+            <a:ext cx="10857186" cy="509752"/>
+          </a:xfrm>
+          <a:prstGeom prst="rect">
+            <a:avLst/>
+          </a:prstGeom>
+          <a:solidFill>
+            <a:schemeClr val="bg1">
+              <a:lumMod val="75000"/>
+            </a:schemeClr>
+          </a:solidFill>
+        </p:spPr>
+        <p:style>
+          <a:lnRef idx="2">
+            <a:schemeClr val="accent1">
+              <a:shade val="15000"/>
+            </a:schemeClr>
+          </a:lnRef>
+          <a:fillRef idx="1">
+            <a:schemeClr val="accent1"/>
+          </a:fillRef>
+          <a:effectRef idx="0">
+            <a:schemeClr val="accent1"/>
+          </a:effectRef>
+          <a:fontRef idx="minor">
+            <a:schemeClr val="lt1"/>
+          </a:fontRef>
+        </p:style>
+        <p:txBody>
+          <a:bodyPr rtlCol="0" anchor="ctr"/>
+          <a:lstStyle/>
+          <a:p>
+            <a:pPr algn="ctr"/>
+            <a:endParaRPr lang="en-US"/>
+          </a:p>
+        </p:txBody>
+      </p:sp>
+      <p:cxnSp>
+        <p:nvCxnSpPr>
+          <p:cNvPr id="18" name="Straight Connector 17">
+            <a:extLst>
+              <a:ext uri="{FF2B5EF4-FFF2-40B4-BE49-F238E27FC236}">
+                <a16:creationId xmlns:a16="http://schemas.microsoft.com/office/drawing/2014/main" id="{4848313A-AE7E-4FB7-CACC-5EED2AB6187E}"/>
+              </a:ext>
+            </a:extLst>
+          </p:cNvPr>
+          <p:cNvCxnSpPr/>
+          <p:nvPr/>
+        </p:nvCxnSpPr>
+        <p:spPr>
+          <a:xfrm>
+            <a:off x="404648" y="557049"/>
+            <a:ext cx="0" cy="388883"/>
+          </a:xfrm>
+          <a:prstGeom prst="line">
+            <a:avLst/>
+          </a:prstGeom>
+          <a:ln>
+            <a:solidFill>
+              <a:schemeClr val="tx2">
+                <a:lumMod val="75000"/>
+                <a:lumOff val="25000"/>
+              </a:schemeClr>
+            </a:solidFill>
+          </a:ln>
+        </p:spPr>
+        <p:style>
+          <a:lnRef idx="2">
+            <a:schemeClr val="accent4"/>
+          </a:lnRef>
+          <a:fillRef idx="0">
+            <a:schemeClr val="accent4"/>
+          </a:fillRef>
+          <a:effectRef idx="1">
+            <a:schemeClr val="accent4"/>
+          </a:effectRef>
+          <a:fontRef idx="minor">
+            <a:schemeClr val="tx1"/>
+          </a:fontRef>
+        </p:style>
+      </p:cxnSp>
+      <p:sp>
+        <p:nvSpPr>
+          <p:cNvPr id="19" name="Rectangle 18">
+            <a:extLst>
+              <a:ext uri="{FF2B5EF4-FFF2-40B4-BE49-F238E27FC236}">
+                <a16:creationId xmlns:a16="http://schemas.microsoft.com/office/drawing/2014/main" id="{4707C74D-BF54-552B-21A0-4DAF66C9C0BD}"/>
+              </a:ext>
+            </a:extLst>
+          </p:cNvPr>
+          <p:cNvSpPr/>
+          <p:nvPr/>
+        </p:nvSpPr>
+        <p:spPr>
+          <a:xfrm>
+            <a:off x="1108841" y="557049"/>
+            <a:ext cx="1140373" cy="320565"/>
+          </a:xfrm>
+          <a:prstGeom prst="rect">
+            <a:avLst/>
+          </a:prstGeom>
+          <a:solidFill>
+            <a:schemeClr val="accent4">
+              <a:lumMod val="75000"/>
+            </a:schemeClr>
+          </a:solidFill>
+          <a:ln>
+            <a:noFill/>
+          </a:ln>
+        </p:spPr>
+        <p:style>
+          <a:lnRef idx="2">
+            <a:schemeClr val="accent1">
+              <a:shade val="15000"/>
+            </a:schemeClr>
+          </a:lnRef>
+          <a:fillRef idx="1">
+            <a:schemeClr val="accent1"/>
+          </a:fillRef>
+          <a:effectRef idx="0">
+            <a:schemeClr val="accent1"/>
+          </a:effectRef>
+          <a:fontRef idx="minor">
+            <a:schemeClr val="lt1"/>
+          </a:fontRef>
+        </p:style>
+        <p:txBody>
+          <a:bodyPr rtlCol="0" anchor="ctr"/>
+          <a:lstStyle/>
+          <a:p>
+            <a:pPr algn="ctr"/>
+            <a:r>
+              <a:rPr lang="en-US" dirty="0"/>
+              <a:t>+New</a:t>
+            </a:r>
+          </a:p>
+        </p:txBody>
+      </p:sp>
+      <p:sp>
+        <p:nvSpPr>
+          <p:cNvPr id="20" name="Rectangle 19">
+            <a:extLst>
+              <a:ext uri="{FF2B5EF4-FFF2-40B4-BE49-F238E27FC236}">
+                <a16:creationId xmlns:a16="http://schemas.microsoft.com/office/drawing/2014/main" id="{7DC92439-A4B8-89E5-4C64-1C6659EDCD5A}"/>
+              </a:ext>
+            </a:extLst>
+          </p:cNvPr>
+          <p:cNvSpPr/>
+          <p:nvPr/>
+        </p:nvSpPr>
+        <p:spPr>
+          <a:xfrm>
+            <a:off x="2427890" y="557049"/>
+            <a:ext cx="6511158" cy="320565"/>
+          </a:xfrm>
+          <a:prstGeom prst="rect">
+            <a:avLst/>
+          </a:prstGeom>
+          <a:solidFill>
+            <a:schemeClr val="bg1"/>
+          </a:solidFill>
+        </p:spPr>
+        <p:style>
+          <a:lnRef idx="2">
+            <a:schemeClr val="accent1">
+              <a:shade val="15000"/>
+            </a:schemeClr>
+          </a:lnRef>
+          <a:fillRef idx="1">
+            <a:schemeClr val="accent1"/>
+          </a:fillRef>
+          <a:effectRef idx="0">
+            <a:schemeClr val="accent1"/>
+          </a:effectRef>
+          <a:fontRef idx="minor">
+            <a:schemeClr val="lt1"/>
+          </a:fontRef>
+        </p:style>
+        <p:txBody>
+          <a:bodyPr rtlCol="0" anchor="ctr"/>
+          <a:lstStyle/>
+          <a:p>
+            <a:r>
+              <a:rPr lang="en-US" sz="1400" dirty="0">
+                <a:solidFill>
+                  <a:schemeClr val="tx1"/>
+                </a:solidFill>
+              </a:rPr>
+              <a:t>What do I still need to do?</a:t>
+            </a:r>
+          </a:p>
+        </p:txBody>
+      </p:sp>
+      <p:sp>
+        <p:nvSpPr>
+          <p:cNvPr id="21" name="Rectangle 20">
+            <a:extLst>
+              <a:ext uri="{FF2B5EF4-FFF2-40B4-BE49-F238E27FC236}">
+                <a16:creationId xmlns:a16="http://schemas.microsoft.com/office/drawing/2014/main" id="{12B4F324-0DD0-28FF-6B7C-B084DC03A62B}"/>
+              </a:ext>
+            </a:extLst>
+          </p:cNvPr>
+          <p:cNvSpPr/>
+          <p:nvPr/>
+        </p:nvSpPr>
+        <p:spPr>
+          <a:xfrm>
+            <a:off x="9122979" y="557049"/>
+            <a:ext cx="2159876" cy="320565"/>
+          </a:xfrm>
+          <a:prstGeom prst="rect">
+            <a:avLst/>
+          </a:prstGeom>
+          <a:solidFill>
+            <a:schemeClr val="bg1"/>
+          </a:solidFill>
+        </p:spPr>
+        <p:style>
+          <a:lnRef idx="2">
+            <a:schemeClr val="accent1">
+              <a:shade val="15000"/>
+            </a:schemeClr>
+          </a:lnRef>
+          <a:fillRef idx="1">
+            <a:schemeClr val="accent1"/>
+          </a:fillRef>
+          <a:effectRef idx="0">
+            <a:schemeClr val="accent1"/>
+          </a:effectRef>
+          <a:fontRef idx="minor">
+            <a:schemeClr val="lt1"/>
+          </a:fontRef>
+        </p:style>
+        <p:txBody>
+          <a:bodyPr rtlCol="0" anchor="ctr"/>
+          <a:lstStyle/>
+          <a:p>
+            <a:r>
+              <a:rPr lang="en-US" sz="1600" dirty="0">
+                <a:solidFill>
+                  <a:schemeClr val="tx1"/>
+                </a:solidFill>
+              </a:rPr>
+              <a:t>Most Recent</a:t>
+            </a:r>
+          </a:p>
+        </p:txBody>
+      </p:sp>
+      <p:sp>
+        <p:nvSpPr>
+          <p:cNvPr id="22" name="Isosceles Triangle 21">
+            <a:extLst>
+              <a:ext uri="{FF2B5EF4-FFF2-40B4-BE49-F238E27FC236}">
+                <a16:creationId xmlns:a16="http://schemas.microsoft.com/office/drawing/2014/main" id="{9EF5F207-2FF4-CD93-765D-3FDA7B5C7382}"/>
+              </a:ext>
+            </a:extLst>
+          </p:cNvPr>
+          <p:cNvSpPr/>
+          <p:nvPr/>
+        </p:nvSpPr>
+        <p:spPr>
+          <a:xfrm rot="10800000">
+            <a:off x="10988566" y="651642"/>
+            <a:ext cx="178676" cy="157655"/>
+          </a:xfrm>
+          <a:prstGeom prst="triangle">
+            <a:avLst/>
+          </a:prstGeom>
+          <a:solidFill>
+            <a:schemeClr val="bg1"/>
+          </a:solidFill>
+          <a:ln>
+            <a:solidFill>
+              <a:schemeClr val="tx1"/>
+            </a:solidFill>
+          </a:ln>
+        </p:spPr>
+        <p:style>
+          <a:lnRef idx="2">
+            <a:schemeClr val="accent1">
+              <a:shade val="15000"/>
+            </a:schemeClr>
+          </a:lnRef>
+          <a:fillRef idx="1">
+            <a:schemeClr val="accent1"/>
+          </a:fillRef>
+          <a:effectRef idx="0">
+            <a:schemeClr val="accent1"/>
+          </a:effectRef>
+          <a:fontRef idx="minor">
+            <a:schemeClr val="lt1"/>
+          </a:fontRef>
+        </p:style>
+        <p:txBody>
+          <a:bodyPr rtlCol="0" anchor="ctr"/>
+          <a:lstStyle/>
+          <a:p>
+            <a:pPr algn="ctr"/>
+            <a:endParaRPr lang="en-US"/>
+          </a:p>
+        </p:txBody>
+      </p:sp>
+      <p:sp>
+        <p:nvSpPr>
+          <p:cNvPr id="23" name="Rectangle 22">
+            <a:extLst>
+              <a:ext uri="{FF2B5EF4-FFF2-40B4-BE49-F238E27FC236}">
+                <a16:creationId xmlns:a16="http://schemas.microsoft.com/office/drawing/2014/main" id="{97B7A682-33F8-CB85-7971-6772C959B894}"/>
+              </a:ext>
+            </a:extLst>
+          </p:cNvPr>
+          <p:cNvSpPr/>
+          <p:nvPr/>
+        </p:nvSpPr>
+        <p:spPr>
+          <a:xfrm>
+            <a:off x="1555531" y="1576552"/>
+            <a:ext cx="2942897" cy="1439917"/>
+          </a:xfrm>
+          <a:prstGeom prst="rect">
+            <a:avLst/>
+          </a:prstGeom>
+          <a:solidFill>
+            <a:schemeClr val="accent4">
+              <a:lumMod val="75000"/>
+            </a:schemeClr>
+          </a:solidFill>
+        </p:spPr>
+        <p:style>
+          <a:lnRef idx="2">
+            <a:schemeClr val="accent1">
+              <a:shade val="15000"/>
+            </a:schemeClr>
+          </a:lnRef>
+          <a:fillRef idx="1">
+            <a:schemeClr val="accent1"/>
+          </a:fillRef>
+          <a:effectRef idx="0">
+            <a:schemeClr val="accent1"/>
+          </a:effectRef>
+          <a:fontRef idx="minor">
+            <a:schemeClr val="lt1"/>
+          </a:fontRef>
+        </p:style>
+        <p:txBody>
+          <a:bodyPr rtlCol="0" anchor="t"/>
+          <a:lstStyle/>
+          <a:p>
+            <a:pPr algn="ctr"/>
+            <a:r>
+              <a:rPr lang="en-US" dirty="0"/>
+              <a:t>Requirements.txt </a:t>
+            </a:r>
+          </a:p>
+        </p:txBody>
+      </p:sp>
+      <p:sp>
+        <p:nvSpPr>
+          <p:cNvPr id="24" name="Rectangle 23">
+            <a:extLst>
+              <a:ext uri="{FF2B5EF4-FFF2-40B4-BE49-F238E27FC236}">
+                <a16:creationId xmlns:a16="http://schemas.microsoft.com/office/drawing/2014/main" id="{C2B71AC0-B75A-38AE-67E4-73DCE8ED52F8}"/>
+              </a:ext>
+            </a:extLst>
+          </p:cNvPr>
+          <p:cNvSpPr/>
+          <p:nvPr/>
+        </p:nvSpPr>
+        <p:spPr>
+          <a:xfrm>
+            <a:off x="1555531" y="1907628"/>
+            <a:ext cx="2942897" cy="1145627"/>
+          </a:xfrm>
+          <a:prstGeom prst="rect">
+            <a:avLst/>
+          </a:prstGeom>
+          <a:solidFill>
+            <a:schemeClr val="bg1">
+              <a:lumMod val="85000"/>
+            </a:schemeClr>
+          </a:solidFill>
+        </p:spPr>
+        <p:style>
+          <a:lnRef idx="2">
+            <a:schemeClr val="accent1">
+              <a:shade val="15000"/>
+            </a:schemeClr>
+          </a:lnRef>
+          <a:fillRef idx="1">
+            <a:schemeClr val="accent1"/>
+          </a:fillRef>
+          <a:effectRef idx="0">
+            <a:schemeClr val="accent1"/>
+          </a:effectRef>
+          <a:fontRef idx="minor">
+            <a:schemeClr val="lt1"/>
+          </a:fontRef>
+        </p:style>
+        <p:txBody>
+          <a:bodyPr rtlCol="0" anchor="b"/>
+          <a:lstStyle/>
+          <a:p>
+            <a:pPr algn="ctr"/>
+            <a:r>
+              <a:rPr lang="en-US" dirty="0">
+                <a:solidFill>
+                  <a:schemeClr val="tx1">
+                    <a:lumMod val="95000"/>
+                    <a:lumOff val="5000"/>
+                  </a:schemeClr>
+                </a:solidFill>
+              </a:rPr>
+              <a:t>A document that specifies strict product requirements. </a:t>
+            </a:r>
+          </a:p>
+        </p:txBody>
+      </p:sp>
+      <p:sp>
+        <p:nvSpPr>
+          <p:cNvPr id="25" name="Rectangle 24">
+            <a:extLst>
+              <a:ext uri="{FF2B5EF4-FFF2-40B4-BE49-F238E27FC236}">
+                <a16:creationId xmlns:a16="http://schemas.microsoft.com/office/drawing/2014/main" id="{822C0BDD-0915-ECB1-D2B5-3E160F2060AE}"/>
+              </a:ext>
+            </a:extLst>
+          </p:cNvPr>
+          <p:cNvSpPr/>
+          <p:nvPr/>
+        </p:nvSpPr>
+        <p:spPr>
+          <a:xfrm>
+            <a:off x="4992413" y="1592318"/>
+            <a:ext cx="2942897" cy="1439917"/>
+          </a:xfrm>
+          <a:prstGeom prst="rect">
+            <a:avLst/>
+          </a:prstGeom>
+          <a:solidFill>
+            <a:schemeClr val="accent4">
+              <a:lumMod val="75000"/>
+            </a:schemeClr>
+          </a:solidFill>
+        </p:spPr>
+        <p:style>
+          <a:lnRef idx="2">
+            <a:schemeClr val="accent1">
+              <a:shade val="15000"/>
+            </a:schemeClr>
+          </a:lnRef>
+          <a:fillRef idx="1">
+            <a:schemeClr val="accent1"/>
+          </a:fillRef>
+          <a:effectRef idx="0">
+            <a:schemeClr val="accent1"/>
+          </a:effectRef>
+          <a:fontRef idx="minor">
+            <a:schemeClr val="lt1"/>
+          </a:fontRef>
+        </p:style>
+        <p:txBody>
+          <a:bodyPr rtlCol="0" anchor="t"/>
+          <a:lstStyle/>
+          <a:p>
+            <a:pPr algn="ctr"/>
+            <a:r>
+              <a:rPr lang="en-US" dirty="0"/>
+              <a:t>Project Outline.pptx</a:t>
+            </a:r>
+          </a:p>
+        </p:txBody>
+      </p:sp>
+      <p:sp>
+        <p:nvSpPr>
+          <p:cNvPr id="26" name="Rectangle 25">
+            <a:extLst>
+              <a:ext uri="{FF2B5EF4-FFF2-40B4-BE49-F238E27FC236}">
+                <a16:creationId xmlns:a16="http://schemas.microsoft.com/office/drawing/2014/main" id="{14E4CA7A-5847-E049-1ABF-0E440CE17DFD}"/>
+              </a:ext>
+            </a:extLst>
+          </p:cNvPr>
+          <p:cNvSpPr/>
+          <p:nvPr/>
+        </p:nvSpPr>
+        <p:spPr>
+          <a:xfrm>
+            <a:off x="4992413" y="1923394"/>
+            <a:ext cx="2942897" cy="1145627"/>
+          </a:xfrm>
+          <a:prstGeom prst="rect">
+            <a:avLst/>
+          </a:prstGeom>
+          <a:solidFill>
+            <a:schemeClr val="bg1">
+              <a:lumMod val="85000"/>
+            </a:schemeClr>
+          </a:solidFill>
+        </p:spPr>
+        <p:style>
+          <a:lnRef idx="2">
+            <a:schemeClr val="accent1">
+              <a:shade val="15000"/>
+            </a:schemeClr>
+          </a:lnRef>
+          <a:fillRef idx="1">
+            <a:schemeClr val="accent1"/>
+          </a:fillRef>
+          <a:effectRef idx="0">
+            <a:schemeClr val="accent1"/>
+          </a:effectRef>
+          <a:fontRef idx="minor">
+            <a:schemeClr val="lt1"/>
+          </a:fontRef>
+        </p:style>
+        <p:txBody>
+          <a:bodyPr rtlCol="0" anchor="b"/>
+          <a:lstStyle/>
+          <a:p>
+            <a:pPr algn="ctr"/>
+            <a:r>
+              <a:rPr lang="en-US" b="0" i="0" dirty="0">
+                <a:solidFill>
+                  <a:schemeClr val="tx1"/>
+                </a:solidFill>
+                <a:effectLst/>
+                <a:latin typeface="fontSerif"/>
+              </a:rPr>
+              <a:t>An investor slideshow talking about the project goals and timeline.</a:t>
+            </a:r>
+            <a:endParaRPr lang="en-US" dirty="0">
+              <a:solidFill>
+                <a:schemeClr val="tx1"/>
+              </a:solidFill>
+            </a:endParaRPr>
+          </a:p>
+        </p:txBody>
+      </p:sp>
+      <p:pic>
+        <p:nvPicPr>
+          <p:cNvPr id="1026" name="Picture 2">
+            <a:extLst>
+              <a:ext uri="{FF2B5EF4-FFF2-40B4-BE49-F238E27FC236}">
+                <a16:creationId xmlns:a16="http://schemas.microsoft.com/office/drawing/2014/main" id="{DF5EFE40-41E6-D301-B3F6-A9DC9C0908F5}"/>
+              </a:ext>
+            </a:extLst>
+          </p:cNvPr>
+          <p:cNvPicPr>
+            <a:picLocks noChangeAspect="1" noChangeArrowheads="1"/>
+          </p:cNvPicPr>
+          <p:nvPr/>
+        </p:nvPicPr>
+        <p:blipFill>
+          <a:blip r:embed="rId6">
+            <a:extLst>
+              <a:ext uri="{28A0092B-C50C-407E-A947-70E740481C1C}">
+                <a14:useLocalDpi xmlns:a14="http://schemas.microsoft.com/office/drawing/2010/main" val="0"/>
+              </a:ext>
+            </a:extLst>
+          </a:blip>
+          <a:srcRect/>
+          <a:stretch>
+            <a:fillRect/>
+          </a:stretch>
+        </p:blipFill>
+        <p:spPr bwMode="auto">
+          <a:xfrm>
+            <a:off x="5135721" y="1631733"/>
+            <a:ext cx="270166" cy="251426"/>
+          </a:xfrm>
+          <a:prstGeom prst="rect">
+            <a:avLst/>
+          </a:prstGeom>
+          <a:noFill/>
+          <a:extLst>
+            <a:ext uri="{909E8E84-426E-40DD-AFC4-6F175D3DCCD1}">
+              <a14:hiddenFill xmlns:a14="http://schemas.microsoft.com/office/drawing/2010/main">
+                <a:solidFill>
+                  <a:srgbClr val="FFFFFF"/>
+                </a:solidFill>
+              </a14:hiddenFill>
+            </a:ext>
+          </a:extLst>
+        </p:spPr>
+      </p:pic>
+      <p:pic>
+        <p:nvPicPr>
+          <p:cNvPr id="3" name="Graphic 2">
+            <a:extLst>
+              <a:ext uri="{FF2B5EF4-FFF2-40B4-BE49-F238E27FC236}">
+                <a16:creationId xmlns:a16="http://schemas.microsoft.com/office/drawing/2014/main" id="{149B6375-353E-4095-2A0A-B8E726CDE906}"/>
+              </a:ext>
+            </a:extLst>
+          </p:cNvPr>
+          <p:cNvPicPr>
+            <a:picLocks noChangeAspect="1"/>
+          </p:cNvPicPr>
+          <p:nvPr/>
+        </p:nvPicPr>
+        <p:blipFill>
+          <a:blip r:embed="rId7">
+            <a:extLst>
+              <a:ext uri="{96DAC541-7B7A-43D3-8B79-37D633B846F1}">
+                <asvg:svgBlip xmlns:asvg="http://schemas.microsoft.com/office/drawing/2016/SVG/main" r:embed="rId8"/>
+              </a:ext>
+            </a:extLst>
+          </a:blip>
+          <a:stretch>
+            <a:fillRect/>
+          </a:stretch>
+        </p:blipFill>
+        <p:spPr>
+          <a:xfrm>
+            <a:off x="1714028" y="1574272"/>
+            <a:ext cx="344810" cy="344810"/>
+          </a:xfrm>
+          <a:prstGeom prst="rect">
+            <a:avLst/>
+          </a:prstGeom>
+        </p:spPr>
+      </p:pic>
+    </p:spTree>
+    <p:extLst>
+      <p:ext uri="{BB962C8B-B14F-4D97-AF65-F5344CB8AC3E}">
+        <p14:creationId xmlns:p14="http://schemas.microsoft.com/office/powerpoint/2010/main" val="1491146427"/>
       </p:ext>
     </p:extLst>
   </p:cSld>

</xml_diff>